<commit_message>
Update UGAiForge Acceptance Testing.pptx
Revise intro page
</commit_message>
<xml_diff>
--- a/UGAiForge Acceptance Testing.pptx
+++ b/UGAiForge Acceptance Testing.pptx
@@ -7,6 +7,7 @@
   <p:sldIdLst>
     <p:sldId id="256" r:id="rId2"/>
     <p:sldId id="257" r:id="rId3"/>
+    <p:sldId id="258" r:id="rId4"/>
   </p:sldIdLst>
   <p:sldSz cx="12192000" cy="6858000"/>
   <p:notesSz cx="6858000" cy="9144000"/>
@@ -3372,9 +3373,12 @@
               <a:rPr lang="zh-CN" altLang="en-US" dirty="0"/>
               <a:t> </a:t>
             </a:r>
-            <a:r>
+            <a:br>
               <a:rPr lang="en-AU" altLang="zh-CN" dirty="0"/>
-              <a:t>UI/UX Issues</a:t>
+            </a:br>
+            <a:r>
+              <a:rPr lang="en-AU" altLang="zh-CN" dirty="0"/>
+              <a:t>Acceptance Testing</a:t>
             </a:r>
             <a:endParaRPr lang="en-US" dirty="0"/>
           </a:p>
@@ -3926,6 +3930,338 @@
     <p:extLst>
       <p:ext uri="{BB962C8B-B14F-4D97-AF65-F5344CB8AC3E}">
         <p14:creationId xmlns:p14="http://schemas.microsoft.com/office/powerpoint/2010/main" val="1917580733"/>
+      </p:ext>
+    </p:extLst>
+  </p:cSld>
+  <p:clrMapOvr>
+    <a:masterClrMapping/>
+  </p:clrMapOvr>
+</p:sld>
+</file>
+
+<file path=ppt/slides/slide3.xml><?xml version="1.0" encoding="utf-8"?>
+<p:sld xmlns:a="http://schemas.openxmlformats.org/drawingml/2006/main" xmlns:r="http://schemas.openxmlformats.org/officeDocument/2006/relationships" xmlns:p="http://schemas.openxmlformats.org/presentationml/2006/main">
+  <p:cSld>
+    <p:spTree>
+      <p:nvGrpSpPr>
+        <p:cNvPr id="1" name=""/>
+        <p:cNvGrpSpPr/>
+        <p:nvPr/>
+      </p:nvGrpSpPr>
+      <p:grpSpPr>
+        <a:xfrm>
+          <a:off x="0" y="0"/>
+          <a:ext cx="0" cy="0"/>
+          <a:chOff x="0" y="0"/>
+          <a:chExt cx="0" cy="0"/>
+        </a:xfrm>
+      </p:grpSpPr>
+      <p:pic>
+        <p:nvPicPr>
+          <p:cNvPr id="4" name="Picture 3">
+            <a:extLst>
+              <a:ext uri="{FF2B5EF4-FFF2-40B4-BE49-F238E27FC236}">
+                <a16:creationId xmlns:a16="http://schemas.microsoft.com/office/drawing/2014/main" id="{226BCC20-2C3E-6A5D-16DA-BB06297FA4B4}"/>
+              </a:ext>
+            </a:extLst>
+          </p:cNvPr>
+          <p:cNvPicPr>
+            <a:picLocks noChangeAspect="1"/>
+          </p:cNvPicPr>
+          <p:nvPr/>
+        </p:nvPicPr>
+        <p:blipFill>
+          <a:blip r:embed="rId2"/>
+          <a:stretch>
+            <a:fillRect/>
+          </a:stretch>
+        </p:blipFill>
+        <p:spPr>
+          <a:xfrm>
+            <a:off x="410335" y="489856"/>
+            <a:ext cx="11413445" cy="5900057"/>
+          </a:xfrm>
+          <a:prstGeom prst="rect">
+            <a:avLst/>
+          </a:prstGeom>
+        </p:spPr>
+      </p:pic>
+      <p:sp>
+        <p:nvSpPr>
+          <p:cNvPr id="5" name="TextBox 4">
+            <a:extLst>
+              <a:ext uri="{FF2B5EF4-FFF2-40B4-BE49-F238E27FC236}">
+                <a16:creationId xmlns:a16="http://schemas.microsoft.com/office/drawing/2014/main" id="{E965F867-8A79-4C94-A05F-05E31CE46F2E}"/>
+              </a:ext>
+            </a:extLst>
+          </p:cNvPr>
+          <p:cNvSpPr txBox="1"/>
+          <p:nvPr/>
+        </p:nvSpPr>
+        <p:spPr>
+          <a:xfrm>
+            <a:off x="1390160" y="576943"/>
+            <a:ext cx="4705840" cy="369332"/>
+          </a:xfrm>
+          <a:prstGeom prst="rect">
+            <a:avLst/>
+          </a:prstGeom>
+          <a:noFill/>
+        </p:spPr>
+        <p:txBody>
+          <a:bodyPr wrap="none" rtlCol="0">
+            <a:spAutoFit/>
+          </a:bodyPr>
+          <a:lstStyle/>
+          <a:p>
+            <a:r>
+              <a:rPr lang="en-US" dirty="0" err="1">
+                <a:solidFill>
+                  <a:srgbClr val="FF0000"/>
+                </a:solidFill>
+              </a:rPr>
+              <a:t>UGAiForge是一个连续的词</a:t>
+            </a:r>
+            <a:r>
+              <a:rPr lang="zh-CN" altLang="en-US" dirty="0">
+                <a:solidFill>
+                  <a:srgbClr val="FF0000"/>
+                </a:solidFill>
+              </a:rPr>
+              <a:t>，不要加任何空格</a:t>
+            </a:r>
+            <a:endParaRPr lang="en-AU" altLang="zh-CN" dirty="0">
+              <a:solidFill>
+                <a:srgbClr val="FF0000"/>
+              </a:solidFill>
+            </a:endParaRPr>
+          </a:p>
+        </p:txBody>
+      </p:sp>
+      <p:sp>
+        <p:nvSpPr>
+          <p:cNvPr id="8" name="TextBox 7">
+            <a:extLst>
+              <a:ext uri="{FF2B5EF4-FFF2-40B4-BE49-F238E27FC236}">
+                <a16:creationId xmlns:a16="http://schemas.microsoft.com/office/drawing/2014/main" id="{C82D6283-E05E-6CDF-91B5-9A25997C6D27}"/>
+              </a:ext>
+            </a:extLst>
+          </p:cNvPr>
+          <p:cNvSpPr txBox="1"/>
+          <p:nvPr/>
+        </p:nvSpPr>
+        <p:spPr>
+          <a:xfrm>
+            <a:off x="410335" y="120524"/>
+            <a:ext cx="6096000" cy="369332"/>
+          </a:xfrm>
+          <a:prstGeom prst="rect">
+            <a:avLst/>
+          </a:prstGeom>
+          <a:noFill/>
+        </p:spPr>
+        <p:txBody>
+          <a:bodyPr wrap="square">
+            <a:spAutoFit/>
+          </a:bodyPr>
+          <a:lstStyle/>
+          <a:p>
+            <a:r>
+              <a:rPr lang="zh-CN" altLang="en-US" dirty="0"/>
+              <a:t>改成这样：</a:t>
+            </a:r>
+            <a:r>
+              <a:rPr lang="en-US" altLang="zh-CN" dirty="0"/>
+              <a:t>UGA</a:t>
+            </a:r>
+            <a:r>
+              <a:rPr lang="en-US" altLang="zh-CN" dirty="0">
+                <a:solidFill>
+                  <a:srgbClr val="FF0000"/>
+                </a:solidFill>
+              </a:rPr>
+              <a:t>i</a:t>
+            </a:r>
+            <a:r>
+              <a:rPr lang="en-US" altLang="zh-CN" dirty="0"/>
+              <a:t>Forge</a:t>
+            </a:r>
+            <a:endParaRPr lang="en-US" dirty="0"/>
+          </a:p>
+        </p:txBody>
+      </p:sp>
+      <p:cxnSp>
+        <p:nvCxnSpPr>
+          <p:cNvPr id="10" name="Curved Connector 9">
+            <a:extLst>
+              <a:ext uri="{FF2B5EF4-FFF2-40B4-BE49-F238E27FC236}">
+                <a16:creationId xmlns:a16="http://schemas.microsoft.com/office/drawing/2014/main" id="{B40CE914-AA69-D84F-F0AB-4AB6DA12C00A}"/>
+              </a:ext>
+            </a:extLst>
+          </p:cNvPr>
+          <p:cNvCxnSpPr>
+            <a:stCxn id="8" idx="1"/>
+          </p:cNvCxnSpPr>
+          <p:nvPr/>
+        </p:nvCxnSpPr>
+        <p:spPr>
+          <a:xfrm rot="10800000" flipH="1" flipV="1">
+            <a:off x="410335" y="305189"/>
+            <a:ext cx="166608" cy="347953"/>
+          </a:xfrm>
+          <a:prstGeom prst="curvedConnector4">
+            <a:avLst>
+              <a:gd name="adj1" fmla="val -137208"/>
+              <a:gd name="adj2" fmla="val 76536"/>
+            </a:avLst>
+          </a:prstGeom>
+          <a:ln>
+            <a:headEnd type="triangle" w="sm" len="med"/>
+            <a:tailEnd type="none"/>
+          </a:ln>
+        </p:spPr>
+        <p:style>
+          <a:lnRef idx="2">
+            <a:schemeClr val="accent1"/>
+          </a:lnRef>
+          <a:fillRef idx="0">
+            <a:schemeClr val="accent1"/>
+          </a:fillRef>
+          <a:effectRef idx="1">
+            <a:schemeClr val="accent1"/>
+          </a:effectRef>
+          <a:fontRef idx="minor">
+            <a:schemeClr val="tx1"/>
+          </a:fontRef>
+        </p:style>
+      </p:cxnSp>
+      <p:sp>
+        <p:nvSpPr>
+          <p:cNvPr id="11" name="TextBox 10">
+            <a:extLst>
+              <a:ext uri="{FF2B5EF4-FFF2-40B4-BE49-F238E27FC236}">
+                <a16:creationId xmlns:a16="http://schemas.microsoft.com/office/drawing/2014/main" id="{061C1F19-8E55-C5E6-4EA3-2B6D7897743E}"/>
+              </a:ext>
+            </a:extLst>
+          </p:cNvPr>
+          <p:cNvSpPr txBox="1"/>
+          <p:nvPr/>
+        </p:nvSpPr>
+        <p:spPr>
+          <a:xfrm>
+            <a:off x="2453670" y="3785883"/>
+            <a:ext cx="1569660" cy="369332"/>
+          </a:xfrm>
+          <a:prstGeom prst="rect">
+            <a:avLst/>
+          </a:prstGeom>
+          <a:noFill/>
+        </p:spPr>
+        <p:txBody>
+          <a:bodyPr wrap="none" rtlCol="0">
+            <a:spAutoFit/>
+          </a:bodyPr>
+          <a:lstStyle/>
+          <a:p>
+            <a:r>
+              <a:rPr lang="zh-CN" altLang="en-AU" dirty="0">
+                <a:solidFill>
+                  <a:srgbClr val="FF0000"/>
+                </a:solidFill>
+              </a:rPr>
+              <a:t>改成</a:t>
+            </a:r>
+            <a:r>
+              <a:rPr lang="zh-CN" altLang="en-US" dirty="0">
+                <a:solidFill>
+                  <a:srgbClr val="FF0000"/>
+                </a:solidFill>
+              </a:rPr>
+              <a:t>下面描述</a:t>
+            </a:r>
+            <a:endParaRPr lang="en-AU" altLang="zh-CN" dirty="0">
+              <a:solidFill>
+                <a:srgbClr val="FF0000"/>
+              </a:solidFill>
+            </a:endParaRPr>
+          </a:p>
+        </p:txBody>
+      </p:sp>
+      <p:sp>
+        <p:nvSpPr>
+          <p:cNvPr id="12" name="TextBox 11">
+            <a:extLst>
+              <a:ext uri="{FF2B5EF4-FFF2-40B4-BE49-F238E27FC236}">
+                <a16:creationId xmlns:a16="http://schemas.microsoft.com/office/drawing/2014/main" id="{7ECE44B9-D4A5-7CDF-FD0D-1DC717F47CC5}"/>
+              </a:ext>
+            </a:extLst>
+          </p:cNvPr>
+          <p:cNvSpPr txBox="1"/>
+          <p:nvPr/>
+        </p:nvSpPr>
+        <p:spPr>
+          <a:xfrm>
+            <a:off x="936171" y="3970549"/>
+            <a:ext cx="4604658" cy="1200329"/>
+          </a:xfrm>
+          <a:prstGeom prst="rect">
+            <a:avLst/>
+          </a:prstGeom>
+          <a:noFill/>
+        </p:spPr>
+        <p:txBody>
+          <a:bodyPr wrap="square" rtlCol="0">
+            <a:spAutoFit/>
+          </a:bodyPr>
+          <a:lstStyle/>
+          <a:p>
+            <a:pPr algn="ctr"/>
+            <a:r>
+              <a:rPr lang="en-AU" altLang="zh-CN" sz="3600" dirty="0"/>
+              <a:t>Welcome to </a:t>
+            </a:r>
+            <a:r>
+              <a:rPr lang="en-AU" altLang="zh-CN" sz="3600" dirty="0" err="1"/>
+              <a:t>UGA</a:t>
+            </a:r>
+            <a:r>
+              <a:rPr lang="en-AU" altLang="zh-CN" sz="3600" dirty="0" err="1">
+                <a:solidFill>
+                  <a:srgbClr val="FF0000"/>
+                </a:solidFill>
+              </a:rPr>
+              <a:t>i</a:t>
+            </a:r>
+            <a:r>
+              <a:rPr lang="en-AU" altLang="zh-CN" sz="3600" dirty="0" err="1"/>
+              <a:t>Foge</a:t>
+            </a:r>
+            <a:endParaRPr lang="en-AU" altLang="zh-CN" dirty="0"/>
+          </a:p>
+          <a:p>
+            <a:endParaRPr lang="en-AU" altLang="zh-CN" dirty="0"/>
+          </a:p>
+          <a:p>
+            <a:pPr algn="ctr"/>
+            <a:r>
+              <a:rPr lang="en-AU" altLang="zh-CN" dirty="0"/>
+              <a:t>Think, Describe</a:t>
+            </a:r>
+            <a:r>
+              <a:rPr lang="en-AU" altLang="zh-CN"/>
+              <a:t>, and Build </a:t>
+            </a:r>
+            <a:r>
+              <a:rPr lang="en-AU" altLang="zh-CN" dirty="0"/>
+              <a:t>with AI and for AI </a:t>
+            </a:r>
+          </a:p>
+        </p:txBody>
+      </p:sp>
+    </p:spTree>
+    <p:extLst>
+      <p:ext uri="{BB962C8B-B14F-4D97-AF65-F5344CB8AC3E}">
+        <p14:creationId xmlns:p14="http://schemas.microsoft.com/office/powerpoint/2010/main" val="1443498527"/>
       </p:ext>
     </p:extLst>
   </p:cSld>

</xml_diff>